<commit_message>
Updated testing methods slide
</commit_message>
<xml_diff>
--- a/docs/Fine-tuning LLMs.pptx
+++ b/docs/Fine-tuning LLMs.pptx
@@ -11587,7 +11587,7 @@
             <a:tbl>
               <a:tblPr>
                 <a:noFill/>
-                <a:tableStyleId>{521D05D4-300D-4855-8D3C-B209B2956E80}</a:tableStyleId>
+                <a:tableStyleId>{71960870-12CA-4B41-B24A-F564CDB80273}</a:tableStyleId>
               </a:tblPr>
               <a:tblGrid>
                 <a:gridCol w="327000"/>
@@ -12548,6 +12548,30 @@
               <a:buNone/>
             </a:pPr>
             <a:r>
+              <a:rPr lang="en">
+                <a:solidFill>
+                  <a:schemeClr val="dk2"/>
+                </a:solidFill>
+              </a:rPr>
+              <a:t>(Note: we attempted to use Starbucks’ privacy policy)</a:t>
+            </a:r>
+            <a:endParaRPr>
+              <a:solidFill>
+                <a:schemeClr val="dk2"/>
+              </a:solidFill>
+            </a:endParaRPr>
+          </a:p>
+          <a:p>
+            <a:pPr indent="0" lvl="0" marL="0" rtl="0" algn="l">
+              <a:spcBef>
+                <a:spcPts val="0"/>
+              </a:spcBef>
+              <a:spcAft>
+                <a:spcPts val="0"/>
+              </a:spcAft>
+              <a:buNone/>
+            </a:pPr>
+            <a:r>
               <a:t/>
             </a:r>
             <a:endParaRPr>

</xml_diff>